<commit_message>
fix: final adjustments to Session 2 slides
</commit_message>
<xml_diff>
--- a/documentation/Session 2.pptx
+++ b/documentation/Session 2.pptx
@@ -15061,21 +15061,8 @@
                   <a:schemeClr val="bg1"/>
                 </a:solidFill>
               </a:rPr>
-              <a:t>Notebooks/</a:t>
-            </a:r>
-            <a:r>
-              <a:rPr lang="en-US" sz="2000" dirty="0" err="1">
-                <a:solidFill>
-                  <a:schemeClr val="bg1"/>
-                </a:solidFill>
-              </a:rPr>
-              <a:t>hyper_parameter_selection.ipynb</a:t>
-            </a:r>
-            <a:endParaRPr lang="en-US" sz="2000" dirty="0">
-              <a:solidFill>
-                <a:schemeClr val="bg1"/>
-              </a:solidFill>
-            </a:endParaRPr>
+              <a:t>scripts/hyper_parameter_selection.py</a:t>
+            </a:r>
           </a:p>
           <a:p>
             <a:pPr lvl="0">
@@ -19028,7 +19015,7 @@
                   <a:srgbClr val="72AF2F"/>
                 </a:solidFill>
               </a:rPr>
-              <a:t>Please answer the following questions:</a:t>
+              <a:t>Please try to find good hyper parameters</a:t>
             </a:r>
           </a:p>
           <a:p>
@@ -19043,22 +19030,23 @@
                   <a:srgbClr val="72AF2F"/>
                 </a:solidFill>
               </a:rPr>
-              <a:t>How do you evaluate trained models?</a:t>
-            </a:r>
-          </a:p>
-          <a:p>
-            <a:pPr>
-              <a:buClr>
-                <a:srgbClr val="72AF2F"/>
-              </a:buClr>
-            </a:pPr>
+              <a:t>Please use notebook </a:t>
+            </a:r>
+            <a:r>
+              <a:rPr lang="en-US" sz="2000" dirty="0" err="1">
+                <a:solidFill>
+                  <a:srgbClr val="72AF2F"/>
+                </a:solidFill>
+              </a:rPr>
+              <a:t>manual_model_selection.ipynb</a:t>
+            </a:r>
             <a:r>
               <a:rPr lang="en-US" sz="2000" dirty="0">
                 <a:solidFill>
                   <a:srgbClr val="72AF2F"/>
                 </a:solidFill>
               </a:rPr>
-              <a:t>How do you store trained models?</a:t>
+              <a:t> </a:t>
             </a:r>
           </a:p>
           <a:p>
@@ -19073,7 +19061,39 @@
                   <a:srgbClr val="72AF2F"/>
                 </a:solidFill>
               </a:rPr>
-              <a:t>How do you use them as part of a software system?</a:t>
+              <a:t>Change the “Model Creation” cell to find a good model</a:t>
+            </a:r>
+          </a:p>
+          <a:p>
+            <a:pPr>
+              <a:buClr>
+                <a:srgbClr val="72AF2F"/>
+              </a:buClr>
+            </a:pPr>
+            <a:r>
+              <a:rPr lang="en-US" sz="2000" dirty="0">
+                <a:solidFill>
+                  <a:srgbClr val="72AF2F"/>
+                </a:solidFill>
+              </a:rPr>
+              <a:t>Post the cell content into this Google Form (</a:t>
+            </a:r>
+            <a:r>
+              <a:rPr lang="en-US" sz="2000" dirty="0">
+                <a:solidFill>
+                  <a:srgbClr val="72AF2F"/>
+                </a:solidFill>
+                <a:hlinkClick r:id="rId3"/>
+              </a:rPr>
+              <a:t>link</a:t>
+            </a:r>
+            <a:r>
+              <a:rPr lang="en-US" sz="2000" dirty="0">
+                <a:solidFill>
+                  <a:srgbClr val="72AF2F"/>
+                </a:solidFill>
+              </a:rPr>
+              <a:t>)</a:t>
             </a:r>
           </a:p>
           <a:p>
@@ -19106,7 +19126,7 @@
                   <a:srgbClr val="72AF2F"/>
                 </a:solidFill>
               </a:rPr>
-              <a:t>	  Please research your answers </a:t>
+              <a:t>	  There will be a trophy for the best solution next week </a:t>
             </a:r>
             <a:r>
               <a:rPr lang="en-US" sz="2200" dirty="0">
@@ -19115,21 +19135,7 @@
                 </a:solidFill>
                 <a:sym typeface="Wingdings" panose="05000000000000000000" pitchFamily="2" charset="2"/>
               </a:rPr>
-              <a:t></a:t>
-            </a:r>
-          </a:p>
-          <a:p>
-            <a:pPr marL="114300" indent="0">
-              <a:buNone/>
-            </a:pPr>
-            <a:r>
-              <a:rPr lang="en-US" sz="2200" dirty="0">
-                <a:solidFill>
-                  <a:srgbClr val="72AF2F"/>
-                </a:solidFill>
-                <a:sym typeface="Wingdings" panose="05000000000000000000" pitchFamily="2" charset="2"/>
-              </a:rPr>
-              <a:t>             The Answers are for you. No submission needed.</a:t>
+              <a:t> </a:t>
             </a:r>
             <a:endParaRPr lang="en-US" sz="2200" dirty="0">
               <a:solidFill>

</xml_diff>